<commit_message>
minor changes on presentation.
</commit_message>
<xml_diff>
--- a/proj_03_Capstone/step_10 presentation/Airline On Time Analysis System.pptx
+++ b/proj_03_Capstone/step_10 presentation/Airline On Time Analysis System.pptx
@@ -6640,7 +6640,7 @@
             <a:tbl>
               <a:tblPr>
                 <a:noFill/>
-                <a:tableStyleId>{2DA73D45-28BA-49FE-9A37-7859FDFCD855}</a:tableStyleId>
+                <a:tableStyleId>{178CB95F-2EC1-4F19-85FB-094411DFDE54}</a:tableStyleId>
               </a:tblPr>
               <a:tblGrid>
                 <a:gridCol w="1180600"/>
@@ -8181,8 +8181,8 @@
         </p:blipFill>
         <p:spPr>
           <a:xfrm>
-            <a:off x="86675" y="1005131"/>
-            <a:ext cx="9144001" cy="3563889"/>
+            <a:off x="152400" y="975900"/>
+            <a:ext cx="8839201" cy="3792792"/>
           </a:xfrm>
           <a:prstGeom prst="rect">
             <a:avLst/>

</xml_diff>